<commit_message>
added new Timecards folder and updated weekly documents
</commit_message>
<xml_diff>
--- a/Powerpoints/CS0007 Week 6.pptx
+++ b/Powerpoints/CS0007 Week 6.pptx
@@ -118,6 +118,11 @@
       </a:defRPr>
     </a:lvl9pPr>
   </p:defaultTextStyle>
+  <p:extLst>
+    <p:ext uri="{EFAFB233-063F-42B5-8137-9DF3F51BA10A}">
+      <p15:sldGuideLst xmlns:p15="http://schemas.microsoft.com/office/powerpoint/2012/main"/>
+    </p:ext>
+  </p:extLst>
 </p:presentation>
 </file>
 
@@ -252,7 +257,7 @@
           <a:p>
             <a:fld id="{575B001A-E591-4F52-AA90-C464AD9EEC80}" type="datetimeFigureOut">
               <a:rPr lang="en-US" smtClean="0"/>
-              <a:t>2/8/2016</a:t>
+              <a:t>2/10/2016</a:t>
             </a:fld>
             <a:endParaRPr lang="en-US"/>
           </a:p>
@@ -422,7 +427,7 @@
           <a:p>
             <a:fld id="{575B001A-E591-4F52-AA90-C464AD9EEC80}" type="datetimeFigureOut">
               <a:rPr lang="en-US" smtClean="0"/>
-              <a:t>2/8/2016</a:t>
+              <a:t>2/10/2016</a:t>
             </a:fld>
             <a:endParaRPr lang="en-US"/>
           </a:p>
@@ -602,7 +607,7 @@
           <a:p>
             <a:fld id="{575B001A-E591-4F52-AA90-C464AD9EEC80}" type="datetimeFigureOut">
               <a:rPr lang="en-US" smtClean="0"/>
-              <a:t>2/8/2016</a:t>
+              <a:t>2/10/2016</a:t>
             </a:fld>
             <a:endParaRPr lang="en-US"/>
           </a:p>
@@ -772,7 +777,7 @@
           <a:p>
             <a:fld id="{575B001A-E591-4F52-AA90-C464AD9EEC80}" type="datetimeFigureOut">
               <a:rPr lang="en-US" smtClean="0"/>
-              <a:t>2/8/2016</a:t>
+              <a:t>2/10/2016</a:t>
             </a:fld>
             <a:endParaRPr lang="en-US"/>
           </a:p>
@@ -1018,7 +1023,7 @@
           <a:p>
             <a:fld id="{575B001A-E591-4F52-AA90-C464AD9EEC80}" type="datetimeFigureOut">
               <a:rPr lang="en-US" smtClean="0"/>
-              <a:t>2/8/2016</a:t>
+              <a:t>2/10/2016</a:t>
             </a:fld>
             <a:endParaRPr lang="en-US"/>
           </a:p>
@@ -1250,7 +1255,7 @@
           <a:p>
             <a:fld id="{575B001A-E591-4F52-AA90-C464AD9EEC80}" type="datetimeFigureOut">
               <a:rPr lang="en-US" smtClean="0"/>
-              <a:t>2/8/2016</a:t>
+              <a:t>2/10/2016</a:t>
             </a:fld>
             <a:endParaRPr lang="en-US"/>
           </a:p>
@@ -1617,7 +1622,7 @@
           <a:p>
             <a:fld id="{575B001A-E591-4F52-AA90-C464AD9EEC80}" type="datetimeFigureOut">
               <a:rPr lang="en-US" smtClean="0"/>
-              <a:t>2/8/2016</a:t>
+              <a:t>2/10/2016</a:t>
             </a:fld>
             <a:endParaRPr lang="en-US"/>
           </a:p>
@@ -1735,7 +1740,7 @@
           <a:p>
             <a:fld id="{575B001A-E591-4F52-AA90-C464AD9EEC80}" type="datetimeFigureOut">
               <a:rPr lang="en-US" smtClean="0"/>
-              <a:t>2/8/2016</a:t>
+              <a:t>2/10/2016</a:t>
             </a:fld>
             <a:endParaRPr lang="en-US"/>
           </a:p>
@@ -1830,7 +1835,7 @@
           <a:p>
             <a:fld id="{575B001A-E591-4F52-AA90-C464AD9EEC80}" type="datetimeFigureOut">
               <a:rPr lang="en-US" smtClean="0"/>
-              <a:t>2/8/2016</a:t>
+              <a:t>2/10/2016</a:t>
             </a:fld>
             <a:endParaRPr lang="en-US"/>
           </a:p>
@@ -2107,7 +2112,7 @@
           <a:p>
             <a:fld id="{575B001A-E591-4F52-AA90-C464AD9EEC80}" type="datetimeFigureOut">
               <a:rPr lang="en-US" smtClean="0"/>
-              <a:t>2/8/2016</a:t>
+              <a:t>2/10/2016</a:t>
             </a:fld>
             <a:endParaRPr lang="en-US"/>
           </a:p>
@@ -2360,7 +2365,7 @@
           <a:p>
             <a:fld id="{575B001A-E591-4F52-AA90-C464AD9EEC80}" type="datetimeFigureOut">
               <a:rPr lang="en-US" smtClean="0"/>
-              <a:t>2/8/2016</a:t>
+              <a:t>2/10/2016</a:t>
             </a:fld>
             <a:endParaRPr lang="en-US"/>
           </a:p>
@@ -2573,7 +2578,7 @@
           <a:p>
             <a:fld id="{575B001A-E591-4F52-AA90-C464AD9EEC80}" type="datetimeFigureOut">
               <a:rPr lang="en-US" smtClean="0"/>
-              <a:t>2/8/2016</a:t>
+              <a:t>2/10/2016</a:t>
             </a:fld>
             <a:endParaRPr lang="en-US"/>
           </a:p>
@@ -4066,6 +4071,36 @@
           </a:p>
         </p:txBody>
       </p:sp>
+      <p:sp>
+        <p:nvSpPr>
+          <p:cNvPr id="5" name="TextBox 4"/>
+          <p:cNvSpPr txBox="1"/>
+          <p:nvPr/>
+        </p:nvSpPr>
+        <p:spPr>
+          <a:xfrm>
+            <a:off x="9434097" y="4471806"/>
+            <a:ext cx="455574" cy="369332"/>
+          </a:xfrm>
+          <a:prstGeom prst="rect">
+            <a:avLst/>
+          </a:prstGeom>
+          <a:noFill/>
+        </p:spPr>
+        <p:txBody>
+          <a:bodyPr wrap="none" rtlCol="0">
+            <a:spAutoFit/>
+          </a:bodyPr>
+          <a:lstStyle/>
+          <a:p>
+            <a:r>
+              <a:rPr lang="en-US" dirty="0" smtClean="0"/>
+              <a:t>No</a:t>
+            </a:r>
+            <a:endParaRPr lang="en-US" dirty="0"/>
+          </a:p>
+        </p:txBody>
+      </p:sp>
     </p:spTree>
     <p:extLst>
       <p:ext uri="{BB962C8B-B14F-4D97-AF65-F5344CB8AC3E}">
@@ -4736,7 +4771,7 @@
           <a:p>
             <a:r>
               <a:rPr lang="en-US" dirty="0" smtClean="0"/>
-              <a:t>Use Scanner, along with the next() method to read in the user’s name and modify the welcome message accordingly!  Try to describe your project as detailed as possible.</a:t>
+              <a:t>Try to describe your project as detailed as possible.</a:t>
             </a:r>
           </a:p>
         </p:txBody>
@@ -5244,7 +5279,9 @@
             <a:ext cx="1166948" cy="330926"/>
           </a:xfrm>
           <a:prstGeom prst="roundRect">
-            <a:avLst/>
+            <a:avLst>
+              <a:gd name="adj" fmla="val 50000"/>
+            </a:avLst>
           </a:prstGeom>
           <a:solidFill>
             <a:srgbClr val="FF0000"/>
@@ -5317,7 +5354,9 @@
             <a:ext cx="1166948" cy="330926"/>
           </a:xfrm>
           <a:prstGeom prst="roundRect">
-            <a:avLst/>
+            <a:avLst>
+              <a:gd name="adj" fmla="val 50000"/>
+            </a:avLst>
           </a:prstGeom>
           <a:solidFill>
             <a:srgbClr val="00B050"/>

</xml_diff>